<commit_message>
Artigo Analise - Ajustes na escrita 2
</commit_message>
<xml_diff>
--- a/Artigo Análise/images/esquema-experimento.pptx
+++ b/Artigo Análise/images/esquema-experimento.pptx
@@ -104,6 +104,11 @@
       </a:defRPr>
     </a:lvl9pPr>
   </p:defaultTextStyle>
+  <p:extLst>
+    <p:ext uri="{EFAFB233-063F-42B5-8137-9DF3F51BA10A}">
+      <p15:sldGuideLst xmlns:p15="http://schemas.microsoft.com/office/powerpoint/2012/main"/>
+    </p:ext>
+  </p:extLst>
 </p:presentation>
 </file>
 
@@ -3335,7 +3340,7 @@
         </p:nvSpPr>
         <p:spPr>
           <a:xfrm>
-            <a:off x="406975" y="2743200"/>
+            <a:off x="496479" y="2040458"/>
             <a:ext cx="2048607" cy="940777"/>
           </a:xfrm>
           <a:prstGeom prst="rect">
@@ -3409,7 +3414,7 @@
         </p:blipFill>
         <p:spPr>
           <a:xfrm>
-            <a:off x="2968067" y="2571567"/>
+            <a:off x="649761" y="3382548"/>
             <a:ext cx="1742044" cy="1284042"/>
           </a:xfrm>
           <a:prstGeom prst="rect">
@@ -3431,7 +3436,7 @@
         </p:nvSpPr>
         <p:spPr>
           <a:xfrm>
-            <a:off x="5935340" y="1831959"/>
+            <a:off x="4456057" y="1918085"/>
             <a:ext cx="2048607" cy="940777"/>
           </a:xfrm>
           <a:prstGeom prst="rect">
@@ -3497,7 +3502,7 @@
         </p:nvSpPr>
         <p:spPr>
           <a:xfrm>
-            <a:off x="5919717" y="3527292"/>
+            <a:off x="4440434" y="3613418"/>
             <a:ext cx="2048607" cy="940777"/>
           </a:xfrm>
           <a:prstGeom prst="rect">
@@ -3571,7 +3576,7 @@
         </p:blipFill>
         <p:spPr>
           <a:xfrm>
-            <a:off x="6096000" y="3710281"/>
+            <a:off x="4656023" y="3755579"/>
             <a:ext cx="420282" cy="574797"/>
           </a:xfrm>
           <a:prstGeom prst="rect">
@@ -3601,7 +3606,7 @@
         </p:blipFill>
         <p:spPr>
           <a:xfrm>
-            <a:off x="6019800" y="1972500"/>
+            <a:off x="4605681" y="2063631"/>
             <a:ext cx="420282" cy="574797"/>
           </a:xfrm>
           <a:prstGeom prst="rect">
@@ -3611,50 +3616,6 @@
       </p:pic>
       <p:cxnSp>
         <p:nvCxnSpPr>
-          <p:cNvPr id="11" name="Conector de Seta Reta 10">
-            <a:extLst>
-              <a:ext uri="{FF2B5EF4-FFF2-40B4-BE49-F238E27FC236}">
-                <a16:creationId xmlns:a16="http://schemas.microsoft.com/office/drawing/2014/main" id="{13672EFE-EBFD-45B3-9126-32FCE4B2BE55}"/>
-              </a:ext>
-            </a:extLst>
-          </p:cNvPr>
-          <p:cNvCxnSpPr>
-            <a:stCxn id="4" idx="3"/>
-          </p:cNvCxnSpPr>
-          <p:nvPr/>
-        </p:nvCxnSpPr>
-        <p:spPr>
-          <a:xfrm flipV="1">
-            <a:off x="2455582" y="3213588"/>
-            <a:ext cx="709649" cy="1"/>
-          </a:xfrm>
-          <a:prstGeom prst="straightConnector1">
-            <a:avLst/>
-          </a:prstGeom>
-          <a:ln w="38100">
-            <a:solidFill>
-              <a:schemeClr val="tx1"/>
-            </a:solidFill>
-            <a:tailEnd type="triangle"/>
-          </a:ln>
-        </p:spPr>
-        <p:style>
-          <a:lnRef idx="1">
-            <a:schemeClr val="accent1"/>
-          </a:lnRef>
-          <a:fillRef idx="0">
-            <a:schemeClr val="accent1"/>
-          </a:fillRef>
-          <a:effectRef idx="0">
-            <a:schemeClr val="accent1"/>
-          </a:effectRef>
-          <a:fontRef idx="minor">
-            <a:schemeClr val="tx1"/>
-          </a:fontRef>
-        </p:style>
-      </p:cxnSp>
-      <p:cxnSp>
-        <p:nvCxnSpPr>
           <p:cNvPr id="13" name="Conector reto 12">
             <a:extLst>
               <a:ext uri="{FF2B5EF4-FFF2-40B4-BE49-F238E27FC236}">
@@ -3668,9 +3629,9 @@
           <p:nvPr/>
         </p:nvCxnSpPr>
         <p:spPr>
-          <a:xfrm>
-            <a:off x="4572000" y="3213588"/>
-            <a:ext cx="852854" cy="0"/>
+          <a:xfrm flipV="1">
+            <a:off x="1520783" y="3181891"/>
+            <a:ext cx="2383002" cy="1937"/>
           </a:xfrm>
           <a:prstGeom prst="line">
             <a:avLst/>
@@ -3712,7 +3673,7 @@
         </p:nvCxnSpPr>
         <p:spPr>
           <a:xfrm>
-            <a:off x="5424854" y="2302347"/>
+            <a:off x="3921370" y="2308581"/>
             <a:ext cx="0" cy="911241"/>
           </a:xfrm>
           <a:prstGeom prst="line">
@@ -3755,7 +3716,7 @@
         </p:nvCxnSpPr>
         <p:spPr>
           <a:xfrm>
-            <a:off x="5424854" y="3135144"/>
+            <a:off x="3921370" y="3149123"/>
             <a:ext cx="0" cy="874148"/>
           </a:xfrm>
           <a:prstGeom prst="line">
@@ -3793,13 +3754,12 @@
           </p:cNvPr>
           <p:cNvCxnSpPr>
             <a:cxnSpLocks/>
-            <a:endCxn id="6" idx="1"/>
           </p:cNvCxnSpPr>
           <p:nvPr/>
         </p:nvCxnSpPr>
         <p:spPr>
           <a:xfrm>
-            <a:off x="5424854" y="2302347"/>
+            <a:off x="3903785" y="2308581"/>
             <a:ext cx="510486" cy="1"/>
           </a:xfrm>
           <a:prstGeom prst="straightConnector1">
@@ -3843,7 +3803,7 @@
         </p:nvCxnSpPr>
         <p:spPr>
           <a:xfrm>
-            <a:off x="5409231" y="3997681"/>
+            <a:off x="3910409" y="4028457"/>
             <a:ext cx="510486" cy="1"/>
           </a:xfrm>
           <a:prstGeom prst="straightConnector1">
@@ -3887,7 +3847,7 @@
         </p:nvCxnSpPr>
         <p:spPr>
           <a:xfrm>
-            <a:off x="7983947" y="2259897"/>
+            <a:off x="6504664" y="2346023"/>
             <a:ext cx="869907" cy="0"/>
           </a:xfrm>
           <a:prstGeom prst="straightConnector1">
@@ -3931,7 +3891,7 @@
         </p:nvCxnSpPr>
         <p:spPr>
           <a:xfrm>
-            <a:off x="7983947" y="4009292"/>
+            <a:off x="6504664" y="4095418"/>
             <a:ext cx="869907" cy="0"/>
           </a:xfrm>
           <a:prstGeom prst="straightConnector1">
@@ -3973,7 +3933,7 @@
         </p:nvSpPr>
         <p:spPr>
           <a:xfrm>
-            <a:off x="9087673" y="1600477"/>
+            <a:off x="9145082" y="1729054"/>
             <a:ext cx="272519" cy="1318840"/>
           </a:xfrm>
           <a:prstGeom prst="leftBrace">
@@ -4022,7 +3982,7 @@
         </p:nvSpPr>
         <p:spPr>
           <a:xfrm>
-            <a:off x="9087673" y="3349872"/>
+            <a:off x="9145082" y="3478449"/>
             <a:ext cx="272519" cy="1318840"/>
           </a:xfrm>
           <a:prstGeom prst="leftBrace">
@@ -4071,7 +4031,7 @@
         </p:nvSpPr>
         <p:spPr>
           <a:xfrm>
-            <a:off x="9360191" y="1758462"/>
+            <a:off x="9417600" y="1887039"/>
             <a:ext cx="2025846" cy="1015663"/>
           </a:xfrm>
           <a:prstGeom prst="rect">
@@ -4124,7 +4084,7 @@
         </p:nvSpPr>
         <p:spPr>
           <a:xfrm>
-            <a:off x="9223932" y="3501460"/>
+            <a:off x="9281341" y="3630037"/>
             <a:ext cx="2025846" cy="1015663"/>
           </a:xfrm>
           <a:prstGeom prst="rect">
@@ -4177,7 +4137,7 @@
         </p:nvSpPr>
         <p:spPr>
           <a:xfrm>
-            <a:off x="4712681" y="2932551"/>
+            <a:off x="2980596" y="2850165"/>
             <a:ext cx="712173" cy="307777"/>
           </a:xfrm>
           <a:prstGeom prst="rect">
@@ -4194,6 +4154,184 @@
             <a:r>
               <a:rPr lang="pt-BR" sz="1400" b="1" i="1" dirty="0"/>
               <a:t>Drivers</a:t>
+            </a:r>
+          </a:p>
+        </p:txBody>
+      </p:sp>
+      <p:cxnSp>
+        <p:nvCxnSpPr>
+          <p:cNvPr id="23" name="Conector reto 22">
+            <a:extLst>
+              <a:ext uri="{FF2B5EF4-FFF2-40B4-BE49-F238E27FC236}">
+                <a16:creationId xmlns:a16="http://schemas.microsoft.com/office/drawing/2014/main" id="{5F6B52D9-B2BC-4CA1-8890-ABF670F9362B}"/>
+              </a:ext>
+            </a:extLst>
+          </p:cNvPr>
+          <p:cNvCxnSpPr>
+            <a:cxnSpLocks/>
+            <a:stCxn id="5" idx="0"/>
+            <a:endCxn id="4" idx="2"/>
+          </p:cNvCxnSpPr>
+          <p:nvPr/>
+        </p:nvCxnSpPr>
+        <p:spPr>
+          <a:xfrm flipV="1">
+            <a:off x="1520783" y="2981235"/>
+            <a:ext cx="0" cy="401313"/>
+          </a:xfrm>
+          <a:prstGeom prst="line">
+            <a:avLst/>
+          </a:prstGeom>
+          <a:ln w="38100">
+            <a:solidFill>
+              <a:schemeClr val="tx1"/>
+            </a:solidFill>
+            <a:prstDash val="sysDot"/>
+          </a:ln>
+        </p:spPr>
+        <p:style>
+          <a:lnRef idx="1">
+            <a:schemeClr val="accent1"/>
+          </a:lnRef>
+          <a:fillRef idx="0">
+            <a:schemeClr val="accent1"/>
+          </a:fillRef>
+          <a:effectRef idx="0">
+            <a:schemeClr val="accent1"/>
+          </a:effectRef>
+          <a:fontRef idx="minor">
+            <a:schemeClr val="tx1"/>
+          </a:fontRef>
+        </p:style>
+      </p:cxnSp>
+      <p:sp>
+        <p:nvSpPr>
+          <p:cNvPr id="38" name="Retângulo 37">
+            <a:extLst>
+              <a:ext uri="{FF2B5EF4-FFF2-40B4-BE49-F238E27FC236}">
+                <a16:creationId xmlns:a16="http://schemas.microsoft.com/office/drawing/2014/main" id="{8235EB77-46B9-4EF9-A742-6E78D8EC8971}"/>
+              </a:ext>
+            </a:extLst>
+          </p:cNvPr>
+          <p:cNvSpPr/>
+          <p:nvPr/>
+        </p:nvSpPr>
+        <p:spPr>
+          <a:xfrm>
+            <a:off x="7390194" y="1918085"/>
+            <a:ext cx="1438355" cy="940777"/>
+          </a:xfrm>
+          <a:prstGeom prst="rect">
+            <a:avLst/>
+          </a:prstGeom>
+          <a:solidFill>
+            <a:schemeClr val="bg1"/>
+          </a:solidFill>
+          <a:ln w="28575">
+            <a:solidFill>
+              <a:schemeClr val="tx1"/>
+            </a:solidFill>
+          </a:ln>
+        </p:spPr>
+        <p:style>
+          <a:lnRef idx="2">
+            <a:schemeClr val="accent1">
+              <a:shade val="50000"/>
+            </a:schemeClr>
+          </a:lnRef>
+          <a:fillRef idx="1">
+            <a:schemeClr val="accent1"/>
+          </a:fillRef>
+          <a:effectRef idx="0">
+            <a:schemeClr val="accent1"/>
+          </a:effectRef>
+          <a:fontRef idx="minor">
+            <a:schemeClr val="lt1"/>
+          </a:fontRef>
+        </p:style>
+        <p:txBody>
+          <a:bodyPr rtlCol="0" anchor="ctr"/>
+          <a:lstStyle/>
+          <a:p>
+            <a:pPr algn="ctr"/>
+            <a:r>
+              <a:rPr lang="pt-BR" sz="1600" dirty="0">
+                <a:ln>
+                  <a:solidFill>
+                    <a:schemeClr val="tx1"/>
+                  </a:solidFill>
+                </a:ln>
+                <a:solidFill>
+                  <a:schemeClr val="tx1"/>
+                </a:solidFill>
+              </a:rPr>
+              <a:t>Execução de operações (CRUD)</a:t>
+            </a:r>
+          </a:p>
+        </p:txBody>
+      </p:sp>
+      <p:sp>
+        <p:nvSpPr>
+          <p:cNvPr id="39" name="Retângulo 38">
+            <a:extLst>
+              <a:ext uri="{FF2B5EF4-FFF2-40B4-BE49-F238E27FC236}">
+                <a16:creationId xmlns:a16="http://schemas.microsoft.com/office/drawing/2014/main" id="{5D79FE9C-967C-494A-BC21-131667CBAC6F}"/>
+              </a:ext>
+            </a:extLst>
+          </p:cNvPr>
+          <p:cNvSpPr/>
+          <p:nvPr/>
+        </p:nvSpPr>
+        <p:spPr>
+          <a:xfrm>
+            <a:off x="7390194" y="3616430"/>
+            <a:ext cx="1438355" cy="940777"/>
+          </a:xfrm>
+          <a:prstGeom prst="rect">
+            <a:avLst/>
+          </a:prstGeom>
+          <a:solidFill>
+            <a:schemeClr val="bg1"/>
+          </a:solidFill>
+          <a:ln w="28575">
+            <a:solidFill>
+              <a:schemeClr val="tx1"/>
+            </a:solidFill>
+          </a:ln>
+        </p:spPr>
+        <p:style>
+          <a:lnRef idx="2">
+            <a:schemeClr val="accent1">
+              <a:shade val="50000"/>
+            </a:schemeClr>
+          </a:lnRef>
+          <a:fillRef idx="1">
+            <a:schemeClr val="accent1"/>
+          </a:fillRef>
+          <a:effectRef idx="0">
+            <a:schemeClr val="accent1"/>
+          </a:effectRef>
+          <a:fontRef idx="minor">
+            <a:schemeClr val="lt1"/>
+          </a:fontRef>
+        </p:style>
+        <p:txBody>
+          <a:bodyPr rtlCol="0" anchor="ctr"/>
+          <a:lstStyle/>
+          <a:p>
+            <a:pPr algn="ctr"/>
+            <a:r>
+              <a:rPr lang="pt-BR" sz="1600" dirty="0">
+                <a:ln>
+                  <a:solidFill>
+                    <a:schemeClr val="tx1"/>
+                  </a:solidFill>
+                </a:ln>
+                <a:solidFill>
+                  <a:schemeClr val="tx1"/>
+                </a:solidFill>
+              </a:rPr>
+              <a:t>Execução de operações (CRUD)</a:t>
             </a:r>
           </a:p>
         </p:txBody>

</xml_diff>